<commit_message>
Updating download link on slides
</commit_message>
<xml_diff>
--- a/assets/presentation.pptx
+++ b/assets/presentation.pptx
@@ -910,7 +910,7 @@
         <p:spPr>
           <a:xfrm>
             <a:off x="722312" y="2906713"/>
-            <a:ext cx="7772401" cy="1500190"/>
+            <a:ext cx="7772401" cy="1500191"/>
           </a:xfrm>
           <a:prstGeom prst="rect">
             <a:avLst/>
@@ -1219,7 +1219,7 @@
         <p:spPr>
           <a:xfrm>
             <a:off x="457200" y="1435464"/>
-            <a:ext cx="4040188" cy="739412"/>
+            <a:ext cx="4040188" cy="739413"/>
           </a:xfrm>
           <a:prstGeom prst="rect">
             <a:avLst/>
@@ -1589,7 +1589,7 @@
         <p:spPr>
           <a:xfrm>
             <a:off x="1792288" y="4800600"/>
-            <a:ext cx="5486403" cy="566738"/>
+            <a:ext cx="5486404" cy="566738"/>
           </a:xfrm>
           <a:prstGeom prst="rect">
             <a:avLst/>
@@ -1624,7 +1624,7 @@
         <p:spPr>
           <a:xfrm>
             <a:off x="1792288" y="5367337"/>
-            <a:ext cx="5486403" cy="804865"/>
+            <a:ext cx="5486404" cy="804866"/>
           </a:xfrm>
           <a:prstGeom prst="rect">
             <a:avLst/>
@@ -1726,7 +1726,7 @@
         <p:spPr>
           <a:xfrm>
             <a:off x="7048482" y="6219825"/>
-            <a:ext cx="1645739" cy="501650"/>
+            <a:ext cx="1645740" cy="501650"/>
           </a:xfrm>
           <a:prstGeom prst="rect">
             <a:avLst/>
@@ -2442,7 +2442,7 @@
           <a:bodyPr/>
           <a:lstStyle/>
           <a:p>
-            <a:pPr lvl="0" marL="1083733" indent="-1083733">
+            <a:pPr lvl="0" marL="1926636" indent="-1926636">
               <a:defRPr sz="1800"/>
             </a:pPr>
             <a:r>
@@ -2458,7 +2458,7 @@
             <a:endParaRPr sz="3200"/>
           </a:p>
           <a:p>
-            <a:pPr lvl="0" marL="1083733" indent="-1083733">
+            <a:pPr lvl="0" marL="1926636" indent="-1926636">
               <a:defRPr sz="1800"/>
             </a:pPr>
             <a:r>
@@ -2490,7 +2490,7 @@
             <a:endParaRPr sz="3200"/>
           </a:p>
           <a:p>
-            <a:pPr lvl="1" marL="1148644" indent="-691444">
+            <a:pPr lvl="1" marL="1532779" indent="-1075579">
               <a:spcBef>
                 <a:spcPts val="600"/>
               </a:spcBef>
@@ -2581,7 +2581,7 @@
           <a:bodyPr/>
           <a:lstStyle/>
           <a:p>
-            <a:pPr lvl="0" marL="1083733" indent="-1083733">
+            <a:pPr lvl="0" marL="1926636" indent="-1926636">
               <a:defRPr sz="1800"/>
             </a:pPr>
             <a:r>
@@ -2597,7 +2597,7 @@
             <a:endParaRPr sz="3200"/>
           </a:p>
           <a:p>
-            <a:pPr lvl="0" marL="1083733" indent="-1083733">
+            <a:pPr lvl="0" marL="1926636" indent="-1926636">
               <a:defRPr sz="1800"/>
             </a:pPr>
             <a:r>
@@ -2685,7 +2685,7 @@
           <a:bodyPr/>
           <a:lstStyle/>
           <a:p>
-            <a:pPr lvl="0" marL="1083733" indent="-1083733">
+            <a:pPr lvl="0" marL="1926636" indent="-1926636">
               <a:defRPr sz="1800"/>
             </a:pPr>
             <a:r>
@@ -2701,7 +2701,7 @@
             <a:endParaRPr sz="3200"/>
           </a:p>
           <a:p>
-            <a:pPr lvl="0" marL="1083733" indent="-1083733">
+            <a:pPr lvl="0" marL="1926636" indent="-1926636">
               <a:defRPr sz="1800"/>
             </a:pPr>
             <a:r>
@@ -2789,7 +2789,7 @@
           <a:bodyPr/>
           <a:lstStyle/>
           <a:p>
-            <a:pPr lvl="0" marL="1083733" indent="-1083733">
+            <a:pPr lvl="0" marL="1926636" indent="-1926636">
               <a:defRPr sz="1800"/>
             </a:pPr>
             <a:r>
@@ -2805,7 +2805,7 @@
             <a:endParaRPr sz="3200"/>
           </a:p>
           <a:p>
-            <a:pPr lvl="0" marL="1083733" indent="-1083733">
+            <a:pPr lvl="0" marL="1926636" indent="-1926636">
               <a:defRPr sz="1800"/>
             </a:pPr>
             <a:r>
@@ -2897,7 +2897,7 @@
           <a:bodyPr/>
           <a:lstStyle/>
           <a:p>
-            <a:pPr lvl="0" marL="1083733" indent="-1083733">
+            <a:pPr lvl="0" marL="1926636" indent="-1926636">
               <a:defRPr sz="1800"/>
             </a:pPr>
             <a:r>
@@ -2913,7 +2913,7 @@
             <a:endParaRPr sz="3200"/>
           </a:p>
           <a:p>
-            <a:pPr lvl="0" marL="1083733" indent="-1083733">
+            <a:pPr lvl="0" marL="1926636" indent="-1926636">
               <a:defRPr sz="1800"/>
             </a:pPr>
             <a:r>
@@ -3001,7 +3001,7 @@
           <a:bodyPr/>
           <a:lstStyle/>
           <a:p>
-            <a:pPr lvl="0" marL="1083733" indent="-1083733">
+            <a:pPr lvl="0" marL="1926636" indent="-1926636">
               <a:defRPr sz="1800"/>
             </a:pPr>
             <a:r>
@@ -3020,7 +3020,7 @@
             <a:endParaRPr sz="2800"/>
           </a:p>
           <a:p>
-            <a:pPr lvl="0" marL="1083733" indent="-1083733">
+            <a:pPr lvl="0" marL="1926636" indent="-1926636">
               <a:defRPr sz="1800"/>
             </a:pPr>
             <a:r>
@@ -3112,7 +3112,7 @@
           <a:bodyPr/>
           <a:lstStyle/>
           <a:p>
-            <a:pPr lvl="0" marL="1083733" indent="-1083733">
+            <a:pPr lvl="0" marL="1926636" indent="-1926636">
               <a:defRPr sz="1800"/>
             </a:pPr>
             <a:r>
@@ -3128,7 +3128,7 @@
             <a:endParaRPr sz="3200"/>
           </a:p>
           <a:p>
-            <a:pPr lvl="0" marL="1083733" indent="-1083733">
+            <a:pPr lvl="0" marL="1926636" indent="-1926636">
               <a:defRPr sz="1800"/>
             </a:pPr>
             <a:r>
@@ -3216,7 +3216,7 @@
           <a:bodyPr/>
           <a:lstStyle/>
           <a:p>
-            <a:pPr lvl="0" marL="1083733" indent="-1083733">
+            <a:pPr lvl="0" marL="1926636" indent="-1926636">
               <a:defRPr sz="1800"/>
             </a:pPr>
             <a:r>
@@ -3232,7 +3232,7 @@
             <a:endParaRPr sz="3200"/>
           </a:p>
           <a:p>
-            <a:pPr lvl="0" marL="1083733" indent="-1083733">
+            <a:pPr lvl="0" marL="1926636" indent="-1926636">
               <a:defRPr sz="1800"/>
             </a:pPr>
             <a:r>
@@ -3320,7 +3320,7 @@
           <a:bodyPr/>
           <a:lstStyle/>
           <a:p>
-            <a:pPr lvl="0" marL="1083733" indent="-1083733">
+            <a:pPr lvl="0" marL="1926636" indent="-1926636">
               <a:defRPr sz="1800"/>
             </a:pPr>
             <a:r>
@@ -3330,7 +3330,7 @@
             <a:endParaRPr sz="3200"/>
           </a:p>
           <a:p>
-            <a:pPr lvl="0" marL="1083733" indent="-1083733">
+            <a:pPr lvl="0" marL="1926636" indent="-1926636">
               <a:defRPr sz="1800"/>
             </a:pPr>
             <a:r>
@@ -3340,7 +3340,7 @@
             <a:endParaRPr sz="3200"/>
           </a:p>
           <a:p>
-            <a:pPr lvl="0" marL="1083733" indent="-1083733">
+            <a:pPr lvl="0" marL="1926636" indent="-1926636">
               <a:defRPr sz="1800"/>
             </a:pPr>
             <a:r>
@@ -3350,7 +3350,7 @@
             <a:endParaRPr sz="3200"/>
           </a:p>
           <a:p>
-            <a:pPr lvl="0" marL="1083733" indent="-1083733">
+            <a:pPr lvl="0" marL="1926636" indent="-1926636">
               <a:defRPr sz="1800"/>
             </a:pPr>
             <a:r>
@@ -3456,7 +3456,7 @@
           <a:bodyPr/>
           <a:lstStyle/>
           <a:p>
-            <a:pPr lvl="0" marL="890058" indent="-890058">
+            <a:pPr lvl="0" marL="1433982" indent="-1433982">
               <a:spcBef>
                 <a:spcPts val="600"/>
               </a:spcBef>
@@ -3480,7 +3480,7 @@
             <a:endParaRPr sz="2500"/>
           </a:p>
           <a:p>
-            <a:pPr lvl="0" marL="890058" indent="-890058">
+            <a:pPr lvl="0" marL="1433982" indent="-1433982">
               <a:spcBef>
                 <a:spcPts val="600"/>
               </a:spcBef>
@@ -3504,7 +3504,7 @@
             <a:endParaRPr sz="2900"/>
           </a:p>
           <a:p>
-            <a:pPr lvl="0" marL="890058" indent="-890058">
+            <a:pPr lvl="0" marL="1433982" indent="-1433982">
               <a:spcBef>
                 <a:spcPts val="600"/>
               </a:spcBef>
@@ -3526,7 +3526,7 @@
             <a:endParaRPr sz="2900"/>
           </a:p>
           <a:p>
-            <a:pPr lvl="0" marL="890058" indent="-890058">
+            <a:pPr lvl="0" marL="1433982" indent="-1433982">
               <a:spcBef>
                 <a:spcPts val="600"/>
               </a:spcBef>
@@ -3617,7 +3617,7 @@
           <a:bodyPr/>
           <a:lstStyle/>
           <a:p>
-            <a:pPr lvl="0" marL="771525" indent="-771525">
+            <a:pPr lvl="0" marL="1157287" indent="-1157287">
               <a:lnSpc>
                 <a:spcPct val="80000"/>
               </a:lnSpc>
@@ -3633,7 +3633,7 @@
             <a:endParaRPr sz="2700"/>
           </a:p>
           <a:p>
-            <a:pPr lvl="1" marL="923748" indent="-466548">
+            <a:pPr lvl="1" marL="1053344" indent="-596144">
               <a:lnSpc>
                 <a:spcPct val="80000"/>
               </a:lnSpc>
@@ -3649,7 +3649,7 @@
             <a:endParaRPr sz="2300"/>
           </a:p>
           <a:p>
-            <a:pPr lvl="1" marL="923748" indent="-466548">
+            <a:pPr lvl="1" marL="1053344" indent="-596144">
               <a:lnSpc>
                 <a:spcPct val="80000"/>
               </a:lnSpc>
@@ -3665,7 +3665,7 @@
             <a:endParaRPr sz="2300"/>
           </a:p>
           <a:p>
-            <a:pPr lvl="1" marL="923748" indent="-466548">
+            <a:pPr lvl="1" marL="1053344" indent="-596144">
               <a:lnSpc>
                 <a:spcPct val="80000"/>
               </a:lnSpc>
@@ -3693,7 +3693,7 @@
             <a:endParaRPr sz="2300"/>
           </a:p>
           <a:p>
-            <a:pPr lvl="0" marL="771525" indent="-771525">
+            <a:pPr lvl="0" marL="1157287" indent="-1157287">
               <a:lnSpc>
                 <a:spcPct val="80000"/>
               </a:lnSpc>
@@ -3709,7 +3709,7 @@
             <a:endParaRPr sz="2700"/>
           </a:p>
           <a:p>
-            <a:pPr lvl="1" marL="923748" indent="-466548">
+            <a:pPr lvl="1" marL="1053344" indent="-596144">
               <a:lnSpc>
                 <a:spcPct val="80000"/>
               </a:lnSpc>
@@ -3739,7 +3739,7 @@
             <a:endParaRPr sz="2300"/>
           </a:p>
           <a:p>
-            <a:pPr lvl="0" marL="771525" indent="-771525">
+            <a:pPr lvl="0" marL="1157287" indent="-1157287">
               <a:lnSpc>
                 <a:spcPct val="80000"/>
               </a:lnSpc>
@@ -3755,7 +3755,7 @@
             <a:endParaRPr sz="2700"/>
           </a:p>
           <a:p>
-            <a:pPr lvl="1" marL="923748" indent="-466548">
+            <a:pPr lvl="1" marL="1053344" indent="-596144">
               <a:lnSpc>
                 <a:spcPct val="80000"/>
               </a:lnSpc>
@@ -3842,7 +3842,7 @@
         </p:nvSpPr>
         <p:spPr>
           <a:xfrm>
-            <a:off x="2374973" y="3103877"/>
+            <a:off x="2374972" y="3103877"/>
             <a:ext cx="4394046" cy="650237"/>
           </a:xfrm>
           <a:prstGeom prst="rect">
@@ -4128,7 +4128,7 @@
           <a:bodyPr/>
           <a:lstStyle/>
           <a:p>
-            <a:pPr lvl="0" marL="609600" indent="-609600">
+            <a:pPr lvl="0" marL="812800" indent="-812800">
               <a:lnSpc>
                 <a:spcPct val="80000"/>
               </a:lnSpc>
@@ -4156,7 +4156,7 @@
             <a:endParaRPr sz="2400"/>
           </a:p>
           <a:p>
-            <a:pPr lvl="0" marL="609600" indent="-609600">
+            <a:pPr lvl="0" marL="812800" indent="-812800">
               <a:lnSpc>
                 <a:spcPct val="80000"/>
               </a:lnSpc>
@@ -4184,7 +4184,7 @@
             <a:endParaRPr sz="2400"/>
           </a:p>
           <a:p>
-            <a:pPr lvl="0" marL="609600" indent="-609600">
+            <a:pPr lvl="0" marL="812800" indent="-812800">
               <a:lnSpc>
                 <a:spcPct val="80000"/>
               </a:lnSpc>
@@ -4212,7 +4212,7 @@
             <a:endParaRPr sz="2400"/>
           </a:p>
           <a:p>
-            <a:pPr lvl="0" marL="609600" indent="-609600">
+            <a:pPr lvl="0" marL="812800" indent="-812800">
               <a:lnSpc>
                 <a:spcPct val="80000"/>
               </a:lnSpc>
@@ -4240,7 +4240,7 @@
             <a:endParaRPr sz="2400"/>
           </a:p>
           <a:p>
-            <a:pPr lvl="0" marL="609600" indent="-609600">
+            <a:pPr lvl="0" marL="812800" indent="-812800">
               <a:lnSpc>
                 <a:spcPct val="80000"/>
               </a:lnSpc>
@@ -4268,7 +4268,7 @@
             <a:endParaRPr sz="2400"/>
           </a:p>
           <a:p>
-            <a:pPr lvl="0" marL="609600" indent="-609600">
+            <a:pPr lvl="0" marL="812800" indent="-812800">
               <a:lnSpc>
                 <a:spcPct val="80000"/>
               </a:lnSpc>
@@ -4367,7 +4367,7 @@
             </a:pPr>
           </a:p>
           <a:p>
-            <a:pPr lvl="0" marL="1083733" indent="-1083733">
+            <a:pPr lvl="0" marL="1926636" indent="-1926636">
               <a:defRPr sz="1800"/>
             </a:pPr>
             <a:r>
@@ -4377,7 +4377,7 @@
             <a:endParaRPr sz="3200"/>
           </a:p>
           <a:p>
-            <a:pPr lvl="1" marL="1148644" indent="-691444">
+            <a:pPr lvl="1" marL="1532779" indent="-1075579">
               <a:spcBef>
                 <a:spcPts val="600"/>
               </a:spcBef>
@@ -4399,7 +4399,7 @@
             <a:endParaRPr sz="2800"/>
           </a:p>
           <a:p>
-            <a:pPr lvl="0" marL="1083733" indent="-1083733">
+            <a:pPr lvl="0" marL="1926636" indent="-1926636">
               <a:defRPr sz="1800"/>
             </a:pPr>
             <a:r>
@@ -4409,7 +4409,7 @@
             <a:endParaRPr sz="3200"/>
           </a:p>
           <a:p>
-            <a:pPr lvl="1" marL="1148644" indent="-691444">
+            <a:pPr lvl="1" marL="1532779" indent="-1075579">
               <a:spcBef>
                 <a:spcPts val="600"/>
               </a:spcBef>
@@ -4422,7 +4422,7 @@
             <a:endParaRPr sz="2800"/>
           </a:p>
           <a:p>
-            <a:pPr lvl="1" marL="1148644" indent="-691444">
+            <a:pPr lvl="1" marL="1532779" indent="-1075579">
               <a:spcBef>
                 <a:spcPts val="600"/>
               </a:spcBef>
@@ -4435,7 +4435,7 @@
             <a:endParaRPr sz="2800"/>
           </a:p>
           <a:p>
-            <a:pPr lvl="1" marL="1148644" indent="-691444">
+            <a:pPr lvl="1" marL="1532779" indent="-1075579">
               <a:spcBef>
                 <a:spcPts val="600"/>
               </a:spcBef>
@@ -4526,7 +4526,7 @@
           <a:bodyPr/>
           <a:lstStyle/>
           <a:p>
-            <a:pPr lvl="0" marL="1083733" indent="-1083733">
+            <a:pPr lvl="0" marL="1926636" indent="-1926636">
               <a:defRPr sz="1800"/>
             </a:pPr>
             <a:r>
@@ -4550,13 +4550,13 @@
               <a:defRPr sz="1800"/>
             </a:pPr>
             <a:r>
-              <a:rPr sz="4500">
+              <a:rPr sz="3700">
                 <a:latin typeface="PT Mono"/>
                 <a:ea typeface="PT Mono"/>
                 <a:cs typeface="PT Mono"/>
                 <a:sym typeface="PT Mono"/>
               </a:rPr>
-              <a:t>git@github.com:nearform/msworkshop.git</a:t>
+              <a:t>https://github.com/nearform/developing-microservices</a:t>
             </a:r>
             <a:endParaRPr sz="4500">
               <a:latin typeface="PT Mono"/>
@@ -4577,7 +4577,7 @@
             <a:endParaRPr sz="2800"/>
           </a:p>
           <a:p>
-            <a:pPr lvl="0" marL="1083733" indent="-1083733">
+            <a:pPr lvl="0" marL="1926636" indent="-1926636">
               <a:defRPr sz="1800"/>
             </a:pPr>
             <a:r>

</xml_diff>